<commit_message>
lecture 20 and 21
</commit_message>
<xml_diff>
--- a/Advanced Reactor Materials/Lec21_AdvancedCladding.pptx
+++ b/Advanced Reactor Materials/Lec21_AdvancedCladding.pptx
@@ -6,8 +6,10 @@
   </p:sldMasterIdLst>
   <p:sldIdLst>
     <p:sldId id="257" r:id="rId2"/>
-    <p:sldId id="407" r:id="rId3"/>
-    <p:sldId id="480" r:id="rId4"/>
+    <p:sldId id="510" r:id="rId3"/>
+    <p:sldId id="407" r:id="rId4"/>
+    <p:sldId id="509" r:id="rId5"/>
+    <p:sldId id="500" r:id="rId6"/>
   </p:sldIdLst>
   <p:sldSz cx="12192000" cy="6858000"/>
   <p:notesSz cx="6858000" cy="9144000"/>
@@ -305,7 +307,7 @@
               <a:pPr>
                 <a:defRPr/>
               </a:pPr>
-              <a:t>9/23/21</a:t>
+              <a:t>11/11/21</a:t>
             </a:fld>
             <a:endParaRPr lang="en-US"/>
           </a:p>
@@ -501,7 +503,7 @@
               <a:pPr>
                 <a:defRPr/>
               </a:pPr>
-              <a:t>9/23/21</a:t>
+              <a:t>11/11/21</a:t>
             </a:fld>
             <a:endParaRPr lang="en-US"/>
           </a:p>
@@ -706,7 +708,7 @@
               <a:pPr>
                 <a:defRPr/>
               </a:pPr>
-              <a:t>9/23/21</a:t>
+              <a:t>11/11/21</a:t>
             </a:fld>
             <a:endParaRPr lang="en-US"/>
           </a:p>
@@ -908,7 +910,7 @@
               <a:pPr>
                 <a:defRPr/>
               </a:pPr>
-              <a:t>9/23/21</a:t>
+              <a:t>11/11/21</a:t>
             </a:fld>
             <a:endParaRPr lang="en-US"/>
           </a:p>
@@ -1181,7 +1183,7 @@
               <a:pPr>
                 <a:defRPr/>
               </a:pPr>
-              <a:t>9/23/21</a:t>
+              <a:t>11/11/21</a:t>
             </a:fld>
             <a:endParaRPr lang="en-US"/>
           </a:p>
@@ -1495,7 +1497,7 @@
               <a:pPr>
                 <a:defRPr/>
               </a:pPr>
-              <a:t>9/23/21</a:t>
+              <a:t>11/11/21</a:t>
             </a:fld>
             <a:endParaRPr lang="en-US"/>
           </a:p>
@@ -1818,7 +1820,7 @@
               <a:pPr>
                 <a:defRPr/>
               </a:pPr>
-              <a:t>9/23/21</a:t>
+              <a:t>11/11/21</a:t>
             </a:fld>
             <a:endParaRPr lang="en-US"/>
           </a:p>
@@ -1962,7 +1964,7 @@
               <a:pPr>
                 <a:defRPr/>
               </a:pPr>
-              <a:t>9/23/21</a:t>
+              <a:t>11/11/21</a:t>
             </a:fld>
             <a:endParaRPr lang="en-US"/>
           </a:p>
@@ -2084,7 +2086,7 @@
               <a:pPr>
                 <a:defRPr/>
               </a:pPr>
-              <a:t>9/23/21</a:t>
+              <a:t>11/11/21</a:t>
             </a:fld>
             <a:endParaRPr lang="en-US"/>
           </a:p>
@@ -2386,7 +2388,7 @@
               <a:pPr>
                 <a:defRPr/>
               </a:pPr>
-              <a:t>9/23/21</a:t>
+              <a:t>11/11/21</a:t>
             </a:fld>
             <a:endParaRPr lang="en-US"/>
           </a:p>
@@ -2673,7 +2675,7 @@
               <a:pPr>
                 <a:defRPr/>
               </a:pPr>
-              <a:t>9/23/21</a:t>
+              <a:t>11/11/21</a:t>
             </a:fld>
             <a:endParaRPr lang="en-US"/>
           </a:p>
@@ -2797,14 +2799,14 @@
           </a:ln>
           <a:extLst>
             <a:ext uri="{909E8E84-426E-40dd-AFC4-6F175D3DCCD1}">
-              <a14:hiddenFill xmlns="" xmlns:a14="http://schemas.microsoft.com/office/drawing/2010/main">
+              <a14:hiddenFill xmlns:a14="http://schemas.microsoft.com/office/drawing/2010/main" xmlns="">
                 <a:solidFill>
                   <a:srgbClr val="FFFFFF"/>
                 </a:solidFill>
               </a14:hiddenFill>
             </a:ext>
             <a:ext uri="{91240B29-F687-4f45-9708-019B960494DF}">
-              <a14:hiddenLine xmlns="" xmlns:a14="http://schemas.microsoft.com/office/drawing/2010/main" w="9525">
+              <a14:hiddenLine xmlns:a14="http://schemas.microsoft.com/office/drawing/2010/main" xmlns="" w="9525">
                 <a:solidFill>
                   <a:srgbClr val="000000"/>
                 </a:solidFill>
@@ -2814,7 +2816,7 @@
               </a14:hiddenLine>
             </a:ext>
             <a:ext uri="{FAA26D3D-D897-4be2-8F04-BA451C77F1D7}">
-              <ma14:placeholderFlag xmlns="" xmlns:ma14="http://schemas.microsoft.com/office/mac/drawingml/2011/main" val="1"/>
+              <ma14:placeholderFlag xmlns:ma14="http://schemas.microsoft.com/office/mac/drawingml/2011/main" xmlns="" val="1"/>
             </a:ext>
           </a:extLst>
         </p:spPr>
@@ -2865,14 +2867,14 @@
           </a:ln>
           <a:extLst>
             <a:ext uri="{909E8E84-426E-40dd-AFC4-6F175D3DCCD1}">
-              <a14:hiddenFill xmlns="" xmlns:a14="http://schemas.microsoft.com/office/drawing/2010/main">
+              <a14:hiddenFill xmlns:a14="http://schemas.microsoft.com/office/drawing/2010/main" xmlns="">
                 <a:solidFill>
                   <a:srgbClr val="FFFFFF"/>
                 </a:solidFill>
               </a14:hiddenFill>
             </a:ext>
             <a:ext uri="{91240B29-F687-4f45-9708-019B960494DF}">
-              <a14:hiddenLine xmlns="" xmlns:a14="http://schemas.microsoft.com/office/drawing/2010/main" w="9525">
+              <a14:hiddenLine xmlns:a14="http://schemas.microsoft.com/office/drawing/2010/main" xmlns="" w="9525">
                 <a:solidFill>
                   <a:srgbClr val="000000"/>
                 </a:solidFill>
@@ -2882,7 +2884,7 @@
               </a14:hiddenLine>
             </a:ext>
             <a:ext uri="{FAA26D3D-D897-4be2-8F04-BA451C77F1D7}">
-              <ma14:placeholderFlag xmlns="" xmlns:ma14="http://schemas.microsoft.com/office/mac/drawingml/2011/main" val="1"/>
+              <ma14:placeholderFlag xmlns:ma14="http://schemas.microsoft.com/office/mac/drawingml/2011/main" xmlns="" val="1"/>
             </a:ext>
           </a:extLst>
         </p:spPr>
@@ -2981,7 +2983,7 @@
               <a:pPr>
                 <a:defRPr/>
               </a:pPr>
-              <a:t>9/23/21</a:t>
+              <a:t>11/11/21</a:t>
             </a:fld>
             <a:endParaRPr lang="en-US" dirty="0"/>
           </a:p>
@@ -3647,7 +3649,7 @@
           <p:cNvPr id="2" name="Title 1">
             <a:extLst>
               <a:ext uri="{FF2B5EF4-FFF2-40B4-BE49-F238E27FC236}">
-                <a16:creationId xmlns:a16="http://schemas.microsoft.com/office/drawing/2014/main" id="{297947CF-EAEA-5F40-93E5-30922295C42A}"/>
+                <a16:creationId xmlns:a16="http://schemas.microsoft.com/office/drawing/2014/main" id="{291111B0-4D23-2B4F-B43C-D3DCA860EFEC}"/>
               </a:ext>
             </a:extLst>
           </p:cNvPr>
@@ -3665,15 +3667,40 @@
           <a:p>
             <a:r>
               <a:rPr lang="en-US" dirty="0"/>
-              <a:t>advanced cladding</a:t>
-            </a:r>
+              <a:t>Last Time</a:t>
+            </a:r>
+          </a:p>
+        </p:txBody>
+      </p:sp>
+      <p:sp>
+        <p:nvSpPr>
+          <p:cNvPr id="3" name="Content Placeholder 2">
+            <a:extLst>
+              <a:ext uri="{FF2B5EF4-FFF2-40B4-BE49-F238E27FC236}">
+                <a16:creationId xmlns:a16="http://schemas.microsoft.com/office/drawing/2014/main" id="{8DA78C5C-C8E6-9340-A5EE-A2B64B84FFAD}"/>
+              </a:ext>
+            </a:extLst>
+          </p:cNvPr>
+          <p:cNvSpPr>
+            <a:spLocks noGrp="1"/>
+          </p:cNvSpPr>
+          <p:nvPr>
+            <p:ph idx="1"/>
+          </p:nvPr>
+        </p:nvSpPr>
+        <p:spPr/>
+        <p:txBody>
+          <a:bodyPr/>
+          <a:lstStyle/>
+          <a:p>
+            <a:endParaRPr lang="en-US"/>
           </a:p>
         </p:txBody>
       </p:sp>
     </p:spTree>
     <p:extLst>
       <p:ext uri="{BB962C8B-B14F-4D97-AF65-F5344CB8AC3E}">
-        <p14:creationId xmlns:p14="http://schemas.microsoft.com/office/powerpoint/2010/main" val="4063663636"/>
+        <p14:creationId xmlns:p14="http://schemas.microsoft.com/office/powerpoint/2010/main" val="988529525"/>
       </p:ext>
     </p:extLst>
   </p:cSld>
@@ -3705,7 +3732,7 @@
           <p:cNvPr id="2" name="Title 1">
             <a:extLst>
               <a:ext uri="{FF2B5EF4-FFF2-40B4-BE49-F238E27FC236}">
-                <a16:creationId xmlns:a16="http://schemas.microsoft.com/office/drawing/2014/main" id="{B96CE851-9CAA-904E-B87E-EDA6E1A4863B}"/>
+                <a16:creationId xmlns:a16="http://schemas.microsoft.com/office/drawing/2014/main" id="{297947CF-EAEA-5F40-93E5-30922295C42A}"/>
               </a:ext>
             </a:extLst>
           </p:cNvPr>
@@ -3723,7 +3750,65 @@
           <a:p>
             <a:r>
               <a:rPr lang="en-US" dirty="0"/>
-              <a:t>SFR Cladding</a:t>
+              <a:t>advanced cladding</a:t>
+            </a:r>
+          </a:p>
+        </p:txBody>
+      </p:sp>
+    </p:spTree>
+    <p:extLst>
+      <p:ext uri="{BB962C8B-B14F-4D97-AF65-F5344CB8AC3E}">
+        <p14:creationId xmlns:p14="http://schemas.microsoft.com/office/powerpoint/2010/main" val="4063663636"/>
+      </p:ext>
+    </p:extLst>
+  </p:cSld>
+  <p:clrMapOvr>
+    <a:masterClrMapping/>
+  </p:clrMapOvr>
+</p:sld>
+</file>
+
+<file path=ppt/slides/slide4.xml><?xml version="1.0" encoding="utf-8"?>
+<p:sld xmlns:a="http://schemas.openxmlformats.org/drawingml/2006/main" xmlns:r="http://schemas.openxmlformats.org/officeDocument/2006/relationships" xmlns:p="http://schemas.openxmlformats.org/presentationml/2006/main">
+  <p:cSld>
+    <p:spTree>
+      <p:nvGrpSpPr>
+        <p:cNvPr id="1" name=""/>
+        <p:cNvGrpSpPr/>
+        <p:nvPr/>
+      </p:nvGrpSpPr>
+      <p:grpSpPr>
+        <a:xfrm>
+          <a:off x="0" y="0"/>
+          <a:ext cx="0" cy="0"/>
+          <a:chOff x="0" y="0"/>
+          <a:chExt cx="0" cy="0"/>
+        </a:xfrm>
+      </p:grpSpPr>
+      <p:sp>
+        <p:nvSpPr>
+          <p:cNvPr id="2" name="Title 1">
+            <a:extLst>
+              <a:ext uri="{FF2B5EF4-FFF2-40B4-BE49-F238E27FC236}">
+                <a16:creationId xmlns:a16="http://schemas.microsoft.com/office/drawing/2014/main" id="{C22EFB36-5F27-9945-A9D8-87E91B00AB40}"/>
+              </a:ext>
+            </a:extLst>
+          </p:cNvPr>
+          <p:cNvSpPr>
+            <a:spLocks noGrp="1"/>
+          </p:cNvSpPr>
+          <p:nvPr>
+            <p:ph type="title"/>
+          </p:nvPr>
+        </p:nvSpPr>
+        <p:spPr/>
+        <p:txBody>
+          <a:bodyPr/>
+          <a:lstStyle/>
+          <a:p>
+            <a:r>
+              <a:rPr lang="en-US" dirty="0"/>
+              <a:t>Irradiation Embrittlement</a:t>
             </a:r>
           </a:p>
         </p:txBody>
@@ -3733,7 +3818,7 @@
           <p:cNvPr id="3" name="Content Placeholder 2">
             <a:extLst>
               <a:ext uri="{FF2B5EF4-FFF2-40B4-BE49-F238E27FC236}">
-                <a16:creationId xmlns:a16="http://schemas.microsoft.com/office/drawing/2014/main" id="{DA5AC39C-F1A3-CA4D-8276-0BBA3895B9A8}"/>
+                <a16:creationId xmlns:a16="http://schemas.microsoft.com/office/drawing/2014/main" id="{2AED229B-5010-894D-AD9B-45DDBB6265CC}"/>
               </a:ext>
             </a:extLst>
           </p:cNvPr>
@@ -3746,8 +3831,8 @@
         </p:nvSpPr>
         <p:spPr>
           <a:xfrm>
-            <a:off x="609599" y="1968503"/>
-            <a:ext cx="6243145" cy="4157663"/>
+            <a:off x="609600" y="1968503"/>
+            <a:ext cx="6109252" cy="4157663"/>
           </a:xfrm>
         </p:spPr>
         <p:txBody>
@@ -3755,38 +3840,35 @@
           <a:lstStyle/>
           <a:p>
             <a:r>
-              <a:rPr lang="en-US" sz="2400" dirty="0"/>
-              <a:t>HT9 is the current cladding material of choice for SFRs</a:t>
-            </a:r>
-          </a:p>
-          <a:p>
-            <a:r>
-              <a:rPr lang="en-US" sz="2400" dirty="0"/>
-              <a:t>HT9 is a </a:t>
-            </a:r>
-            <a:r>
-              <a:rPr lang="en-US" sz="2400" dirty="0" err="1"/>
-              <a:t>nonswelling</a:t>
-            </a:r>
-            <a:r>
-              <a:rPr lang="en-US" sz="2400" dirty="0"/>
-              <a:t> ferritic/martensitic stainless steel</a:t>
-            </a:r>
-          </a:p>
-          <a:p>
-            <a:r>
-              <a:rPr lang="en-US" sz="2400" dirty="0"/>
-              <a:t>The rate of cladding strain has increased for the initially 85% fuel smeared density elements</a:t>
-            </a:r>
-          </a:p>
-          <a:p>
-            <a:endParaRPr lang="en-US" sz="2400" dirty="0"/>
-          </a:p>
-          <a:p>
-            <a:endParaRPr lang="en-US" sz="2400" dirty="0"/>
-          </a:p>
-          <a:p>
-            <a:endParaRPr lang="en-US" sz="2400" dirty="0"/>
+              <a:rPr lang="en-US" sz="2200" dirty="0"/>
+              <a:t>Ferritic steels have these large of monocarbides, which aid in creep resistance</a:t>
+            </a:r>
+          </a:p>
+          <a:p>
+            <a:r>
+              <a:rPr lang="en-US" sz="2200" dirty="0"/>
+              <a:t>The lath boundaries are decorated with Cr rich M23C6 precipitates which increase the thermal stability of the steel</a:t>
+            </a:r>
+          </a:p>
+          <a:p>
+            <a:r>
+              <a:rPr lang="en-US" sz="2200" dirty="0"/>
+              <a:t>Embrittlement is caused by 1) segregation of elements to lath boundaries which make the grain boundaries </a:t>
+            </a:r>
+            <a:r>
+              <a:rPr lang="en-US" sz="2200" dirty="0" err="1"/>
+              <a:t>decohesive</a:t>
+            </a:r>
+            <a:r>
+              <a:rPr lang="en-US" sz="2200" dirty="0"/>
+              <a:t>, and 2) evolution of carbides and intermetallic phases</a:t>
+            </a:r>
+          </a:p>
+          <a:p>
+            <a:endParaRPr lang="en-US" sz="2200" dirty="0"/>
+          </a:p>
+          <a:p>
+            <a:endParaRPr lang="en-US" sz="2200" dirty="0"/>
           </a:p>
         </p:txBody>
       </p:sp>
@@ -3795,7 +3877,7 @@
           <p:cNvPr id="5" name="Slide Number Placeholder 4">
             <a:extLst>
               <a:ext uri="{FF2B5EF4-FFF2-40B4-BE49-F238E27FC236}">
-                <a16:creationId xmlns:a16="http://schemas.microsoft.com/office/drawing/2014/main" id="{000C07CA-C85C-0E46-83B0-05559C6298A2}"/>
+                <a16:creationId xmlns:a16="http://schemas.microsoft.com/office/drawing/2014/main" id="{C3DA07E5-1A72-BA4B-9D53-E645004492FB}"/>
               </a:ext>
             </a:extLst>
           </p:cNvPr>
@@ -3819,9 +3901,151 @@
               <a:pPr>
                 <a:defRPr/>
               </a:pPr>
-              <a:t>3</a:t>
+              <a:t>4</a:t>
             </a:fld>
             <a:endParaRPr lang="en-US"/>
+          </a:p>
+        </p:txBody>
+      </p:sp>
+      <p:sp>
+        <p:nvSpPr>
+          <p:cNvPr id="7" name="Content Placeholder 6">
+            <a:extLst>
+              <a:ext uri="{FF2B5EF4-FFF2-40B4-BE49-F238E27FC236}">
+                <a16:creationId xmlns:a16="http://schemas.microsoft.com/office/drawing/2014/main" id="{56E9ADDF-4841-5D40-8107-49C874CE001E}"/>
+              </a:ext>
+            </a:extLst>
+          </p:cNvPr>
+          <p:cNvSpPr>
+            <a:spLocks noGrp="1"/>
+          </p:cNvSpPr>
+          <p:nvPr>
+            <p:ph sz="half" idx="2"/>
+          </p:nvPr>
+        </p:nvSpPr>
+        <p:spPr>
+          <a:xfrm>
+            <a:off x="6718852" y="1968503"/>
+            <a:ext cx="4863548" cy="4157663"/>
+          </a:xfrm>
+        </p:spPr>
+        <p:txBody>
+          <a:bodyPr/>
+          <a:lstStyle/>
+          <a:p>
+            <a:r>
+              <a:rPr lang="en-US" sz="2200" dirty="0"/>
+              <a:t>For removable components such as clad, which are subjected to high temperature and pressure with a residence time of a few years, creep embrittlement is the issue which decides their design and performance</a:t>
+            </a:r>
+          </a:p>
+          <a:p>
+            <a:r>
+              <a:rPr lang="en-US" sz="2200" dirty="0"/>
+              <a:t>The increase in the ductile to brittle transition temperature, DBTT, is known to be related to irradiation hardening, which is generally observed to saturate with fluence</a:t>
+            </a:r>
+          </a:p>
+          <a:p>
+            <a:endParaRPr lang="en-US" sz="2200" dirty="0"/>
+          </a:p>
+          <a:p>
+            <a:endParaRPr lang="en-US" sz="2200" dirty="0"/>
+          </a:p>
+        </p:txBody>
+      </p:sp>
+    </p:spTree>
+    <p:extLst>
+      <p:ext uri="{BB962C8B-B14F-4D97-AF65-F5344CB8AC3E}">
+        <p14:creationId xmlns:p14="http://schemas.microsoft.com/office/powerpoint/2010/main" val="4253805883"/>
+      </p:ext>
+    </p:extLst>
+  </p:cSld>
+  <p:clrMapOvr>
+    <a:masterClrMapping/>
+  </p:clrMapOvr>
+</p:sld>
+</file>
+
+<file path=ppt/slides/slide5.xml><?xml version="1.0" encoding="utf-8"?>
+<p:sld xmlns:a="http://schemas.openxmlformats.org/drawingml/2006/main" xmlns:r="http://schemas.openxmlformats.org/officeDocument/2006/relationships" xmlns:p="http://schemas.openxmlformats.org/presentationml/2006/main">
+  <p:cSld>
+    <p:spTree>
+      <p:nvGrpSpPr>
+        <p:cNvPr id="1" name=""/>
+        <p:cNvGrpSpPr/>
+        <p:nvPr/>
+      </p:nvGrpSpPr>
+      <p:grpSpPr>
+        <a:xfrm>
+          <a:off x="0" y="0"/>
+          <a:ext cx="0" cy="0"/>
+          <a:chOff x="0" y="0"/>
+          <a:chExt cx="0" cy="0"/>
+        </a:xfrm>
+      </p:grpSpPr>
+      <p:sp>
+        <p:nvSpPr>
+          <p:cNvPr id="2" name="Title 1">
+            <a:extLst>
+              <a:ext uri="{FF2B5EF4-FFF2-40B4-BE49-F238E27FC236}">
+                <a16:creationId xmlns:a16="http://schemas.microsoft.com/office/drawing/2014/main" id="{C22EFB36-5F27-9945-A9D8-87E91B00AB40}"/>
+              </a:ext>
+            </a:extLst>
+          </p:cNvPr>
+          <p:cNvSpPr>
+            <a:spLocks noGrp="1"/>
+          </p:cNvSpPr>
+          <p:nvPr>
+            <p:ph type="title"/>
+          </p:nvPr>
+        </p:nvSpPr>
+        <p:spPr/>
+        <p:txBody>
+          <a:bodyPr/>
+          <a:lstStyle/>
+          <a:p>
+            <a:r>
+              <a:rPr lang="en-US" dirty="0"/>
+              <a:t>Irradiation Embrittlement</a:t>
+            </a:r>
+          </a:p>
+        </p:txBody>
+      </p:sp>
+      <p:sp>
+        <p:nvSpPr>
+          <p:cNvPr id="3" name="Content Placeholder 2">
+            <a:extLst>
+              <a:ext uri="{FF2B5EF4-FFF2-40B4-BE49-F238E27FC236}">
+                <a16:creationId xmlns:a16="http://schemas.microsoft.com/office/drawing/2014/main" id="{2AED229B-5010-894D-AD9B-45DDBB6265CC}"/>
+              </a:ext>
+            </a:extLst>
+          </p:cNvPr>
+          <p:cNvSpPr>
+            <a:spLocks noGrp="1"/>
+          </p:cNvSpPr>
+          <p:nvPr>
+            <p:ph sz="half" idx="1"/>
+          </p:nvPr>
+        </p:nvSpPr>
+        <p:spPr>
+          <a:xfrm>
+            <a:off x="609599" y="1968504"/>
+            <a:ext cx="10972799" cy="675306"/>
+          </a:xfrm>
+        </p:spPr>
+        <p:txBody>
+          <a:bodyPr/>
+          <a:lstStyle/>
+          <a:p>
+            <a:r>
+              <a:rPr lang="en-US" sz="2400" dirty="0"/>
+              <a:t>Extensive evaluation of the embrittlement behavior of the ferritic steels for different chemistry has been performed</a:t>
+            </a:r>
+          </a:p>
+          <a:p>
+            <a:endParaRPr lang="en-US" sz="2400" dirty="0"/>
+          </a:p>
+          <a:p>
+            <a:endParaRPr lang="en-US" sz="2400" dirty="0"/>
           </a:p>
         </p:txBody>
       </p:sp>
@@ -3830,7 +4054,7 @@
           <p:cNvPr id="6" name="Content Placeholder 5">
             <a:extLst>
               <a:ext uri="{FF2B5EF4-FFF2-40B4-BE49-F238E27FC236}">
-                <a16:creationId xmlns:a16="http://schemas.microsoft.com/office/drawing/2014/main" id="{531087AC-ABF8-AA4B-884C-5B745CBDE44E}"/>
+                <a16:creationId xmlns:a16="http://schemas.microsoft.com/office/drawing/2014/main" id="{4AA7758F-EA61-D64D-9A69-433ECD5CAE13}"/>
               </a:ext>
             </a:extLst>
           </p:cNvPr>
@@ -3849,104 +4073,53 @@
         </p:blipFill>
         <p:spPr>
           <a:xfrm>
-            <a:off x="7493876" y="1758056"/>
-            <a:ext cx="3373820" cy="2460384"/>
+            <a:off x="3001341" y="2723321"/>
+            <a:ext cx="6242049" cy="4106611"/>
           </a:xfrm>
           <a:prstGeom prst="rect">
             <a:avLst/>
           </a:prstGeom>
         </p:spPr>
       </p:pic>
-      <p:grpSp>
-        <p:nvGrpSpPr>
-          <p:cNvPr id="9" name="Group 8">
+      <p:sp>
+        <p:nvSpPr>
+          <p:cNvPr id="5" name="Slide Number Placeholder 4">
             <a:extLst>
               <a:ext uri="{FF2B5EF4-FFF2-40B4-BE49-F238E27FC236}">
-                <a16:creationId xmlns:a16="http://schemas.microsoft.com/office/drawing/2014/main" id="{96B7E4DF-7DD2-0F4C-BDDC-1B287FA7D508}"/>
+                <a16:creationId xmlns:a16="http://schemas.microsoft.com/office/drawing/2014/main" id="{C3DA07E5-1A72-BA4B-9D53-E645004492FB}"/>
               </a:ext>
             </a:extLst>
           </p:cNvPr>
-          <p:cNvGrpSpPr/>
-          <p:nvPr/>
-        </p:nvGrpSpPr>
-        <p:grpSpPr>
-          <a:xfrm>
-            <a:off x="7367751" y="4218440"/>
-            <a:ext cx="3885104" cy="2584617"/>
-            <a:chOff x="7367751" y="4218440"/>
-            <a:chExt cx="3885104" cy="2584617"/>
-          </a:xfrm>
-        </p:grpSpPr>
-        <p:pic>
-          <p:nvPicPr>
-            <p:cNvPr id="7" name="Picture 6">
-              <a:extLst>
-                <a:ext uri="{FF2B5EF4-FFF2-40B4-BE49-F238E27FC236}">
-                  <a16:creationId xmlns:a16="http://schemas.microsoft.com/office/drawing/2014/main" id="{6BCD6EFD-6BE5-F241-9BF2-2C363B6643EF}"/>
-                </a:ext>
-              </a:extLst>
-            </p:cNvPr>
-            <p:cNvPicPr>
-              <a:picLocks noChangeAspect="1"/>
-            </p:cNvPicPr>
-            <p:nvPr/>
-          </p:nvPicPr>
-          <p:blipFill>
-            <a:blip r:embed="rId3"/>
-            <a:stretch>
-              <a:fillRect/>
-            </a:stretch>
-          </p:blipFill>
-          <p:spPr>
-            <a:xfrm>
-              <a:off x="7367751" y="4218440"/>
-              <a:ext cx="3885104" cy="2584617"/>
-            </a:xfrm>
-            <a:prstGeom prst="rect">
-              <a:avLst/>
-            </a:prstGeom>
-          </p:spPr>
-        </p:pic>
-        <p:sp>
-          <p:nvSpPr>
-            <p:cNvPr id="8" name="TextBox 7">
-              <a:extLst>
-                <a:ext uri="{FF2B5EF4-FFF2-40B4-BE49-F238E27FC236}">
-                  <a16:creationId xmlns:a16="http://schemas.microsoft.com/office/drawing/2014/main" id="{A6FFB420-B13E-AF4D-9FB4-348E057436AA}"/>
-                </a:ext>
-              </a:extLst>
-            </p:cNvPr>
-            <p:cNvSpPr txBox="1"/>
-            <p:nvPr/>
-          </p:nvSpPr>
-          <p:spPr>
-            <a:xfrm>
-              <a:off x="8460828" y="5057779"/>
-              <a:ext cx="882869" cy="307777"/>
-            </a:xfrm>
-            <a:prstGeom prst="rect">
-              <a:avLst/>
-            </a:prstGeom>
-            <a:noFill/>
-          </p:spPr>
-          <p:txBody>
-            <a:bodyPr wrap="square" rtlCol="0">
-              <a:spAutoFit/>
-            </a:bodyPr>
-            <a:lstStyle/>
-            <a:p>
-              <a:r>
-                <a:rPr lang="en-US" sz="1400" dirty="0"/>
-                <a:t>12.5% BU</a:t>
-              </a:r>
-            </a:p>
-          </p:txBody>
-        </p:sp>
-      </p:grpSp>
+          <p:cNvSpPr>
+            <a:spLocks noGrp="1"/>
+          </p:cNvSpPr>
+          <p:nvPr>
+            <p:ph type="sldNum" sz="quarter" idx="12"/>
+          </p:nvPr>
+        </p:nvSpPr>
+        <p:spPr/>
+        <p:txBody>
+          <a:bodyPr/>
+          <a:lstStyle/>
+          <a:p>
+            <a:pPr>
+              <a:defRPr/>
+            </a:pPr>
+            <a:fld id="{EC35E9FC-F6D5-0349-BBED-EA7D7A9BC49B}" type="slidenum">
+              <a:rPr lang="en-US" smtClean="0"/>
+              <a:pPr>
+                <a:defRPr/>
+              </a:pPr>
+              <a:t>5</a:t>
+            </a:fld>
+            <a:endParaRPr lang="en-US"/>
+          </a:p>
+        </p:txBody>
+      </p:sp>
     </p:spTree>
     <p:extLst>
       <p:ext uri="{BB962C8B-B14F-4D97-AF65-F5344CB8AC3E}">
-        <p14:creationId xmlns:p14="http://schemas.microsoft.com/office/powerpoint/2010/main" val="2739085487"/>
+        <p14:creationId xmlns:p14="http://schemas.microsoft.com/office/powerpoint/2010/main" val="1788869259"/>
       </p:ext>
     </p:extLst>
   </p:cSld>

</xml_diff>